<commit_message>
Upload Files & Soure
</commit_message>
<xml_diff>
--- a/lesson07.pptx
+++ b/lesson07.pptx
@@ -23,7 +23,7 @@
     <p:sldId id="543" r:id="rId14"/>
     <p:sldId id="544" r:id="rId15"/>
     <p:sldId id="564" r:id="rId16"/>
-    <p:sldId id="563" r:id="rId17"/>
+    <p:sldId id="548" r:id="rId17"/>
   </p:sldIdLst>
   <p:sldSz cx="12192000" cy="6858000"/>
   <p:notesSz cx="6858000" cy="9144000"/>
@@ -142,7 +142,7 @@
             <p14:sldId id="543"/>
             <p14:sldId id="544"/>
             <p14:sldId id="564"/>
-            <p14:sldId id="563"/>
+            <p14:sldId id="548"/>
           </p14:sldIdLst>
         </p14:section>
       </p14:sectionLst>
@@ -168,7 +168,7 @@
 <file path=ppt/revisionInfo.xml><?xml version="1.0" encoding="utf-8"?>
 <p1510:revInfo xmlns:a="http://schemas.openxmlformats.org/drawingml/2006/main" xmlns:r="http://schemas.openxmlformats.org/officeDocument/2006/relationships" xmlns:p1510="http://schemas.microsoft.com/office/powerpoint/2015/10/main">
   <p1510:revLst>
-    <p1510:client id="{580846F1-9D2B-49BE-83F7-BCDFE4451383}" v="2" dt="2022-03-22T05:20:12.017"/>
+    <p1510:client id="{151C3C4A-C832-44A2-84EC-9F5F5DDDAE7B}" v="2" dt="2022-10-15T08:03:25.003"/>
   </p1510:revLst>
 </p1510:revInfo>
 </file>
@@ -860,6 +860,61 @@
     </pc:docChg>
   </pc:docChgLst>
   <pc:docChgLst>
+    <pc:chgData name="Anatoliy Kigel" userId="7432c6c4687b0a9c" providerId="LiveId" clId="{151C3C4A-C832-44A2-84EC-9F5F5DDDAE7B}"/>
+    <pc:docChg chg="undo custSel addSld delSld modSld modSection">
+      <pc:chgData name="Anatoliy Kigel" userId="7432c6c4687b0a9c" providerId="LiveId" clId="{151C3C4A-C832-44A2-84EC-9F5F5DDDAE7B}" dt="2022-10-15T08:03:29.785" v="29" actId="14100"/>
+      <pc:docMkLst>
+        <pc:docMk/>
+      </pc:docMkLst>
+      <pc:sldChg chg="addSp modSp add mod">
+        <pc:chgData name="Anatoliy Kigel" userId="7432c6c4687b0a9c" providerId="LiveId" clId="{151C3C4A-C832-44A2-84EC-9F5F5DDDAE7B}" dt="2022-10-15T08:03:29.785" v="29" actId="14100"/>
+        <pc:sldMkLst>
+          <pc:docMk/>
+          <pc:sldMk cId="3253984686" sldId="548"/>
+        </pc:sldMkLst>
+        <pc:spChg chg="add mod">
+          <ac:chgData name="Anatoliy Kigel" userId="7432c6c4687b0a9c" providerId="LiveId" clId="{151C3C4A-C832-44A2-84EC-9F5F5DDDAE7B}" dt="2022-10-15T08:03:29.785" v="29" actId="14100"/>
+          <ac:spMkLst>
+            <pc:docMk/>
+            <pc:sldMk cId="3253984686" sldId="548"/>
+            <ac:spMk id="4" creationId="{40EA5EA8-C923-5115-B669-9BB2BD8261CF}"/>
+          </ac:spMkLst>
+        </pc:spChg>
+        <pc:spChg chg="mod">
+          <ac:chgData name="Anatoliy Kigel" userId="7432c6c4687b0a9c" providerId="LiveId" clId="{151C3C4A-C832-44A2-84EC-9F5F5DDDAE7B}" dt="2022-10-15T08:03:22.735" v="25" actId="1035"/>
+          <ac:spMkLst>
+            <pc:docMk/>
+            <pc:sldMk cId="3253984686" sldId="548"/>
+            <ac:spMk id="10" creationId="{00000000-0000-0000-0000-000000000000}"/>
+          </ac:spMkLst>
+        </pc:spChg>
+        <pc:spChg chg="mod">
+          <ac:chgData name="Anatoliy Kigel" userId="7432c6c4687b0a9c" providerId="LiveId" clId="{151C3C4A-C832-44A2-84EC-9F5F5DDDAE7B}" dt="2022-10-15T08:03:21.501" v="20" actId="1035"/>
+          <ac:spMkLst>
+            <pc:docMk/>
+            <pc:sldMk cId="3253984686" sldId="548"/>
+            <ac:spMk id="11" creationId="{00000000-0000-0000-0000-000000000000}"/>
+          </ac:spMkLst>
+        </pc:spChg>
+        <pc:spChg chg="mod">
+          <ac:chgData name="Anatoliy Kigel" userId="7432c6c4687b0a9c" providerId="LiveId" clId="{151C3C4A-C832-44A2-84EC-9F5F5DDDAE7B}" dt="2022-10-15T08:01:20.793" v="5" actId="20577"/>
+          <ac:spMkLst>
+            <pc:docMk/>
+            <pc:sldMk cId="3253984686" sldId="548"/>
+            <ac:spMk id="12" creationId="{00000000-0000-0000-0000-000000000000}"/>
+          </ac:spMkLst>
+        </pc:spChg>
+      </pc:sldChg>
+      <pc:sldChg chg="del">
+        <pc:chgData name="Anatoliy Kigel" userId="7432c6c4687b0a9c" providerId="LiveId" clId="{151C3C4A-C832-44A2-84EC-9F5F5DDDAE7B}" dt="2022-10-15T08:01:16.132" v="0" actId="47"/>
+        <pc:sldMkLst>
+          <pc:docMk/>
+          <pc:sldMk cId="3356359888" sldId="563"/>
+        </pc:sldMkLst>
+      </pc:sldChg>
+    </pc:docChg>
+  </pc:docChgLst>
+  <pc:docChgLst>
     <pc:chgData name="Anatoliy Kigel" userId="7432c6c4687b0a9c" providerId="LiveId" clId="{580846F1-9D2B-49BE-83F7-BCDFE4451383}"/>
     <pc:docChg chg="modSld">
       <pc:chgData name="Anatoliy Kigel" userId="7432c6c4687b0a9c" providerId="LiveId" clId="{580846F1-9D2B-49BE-83F7-BCDFE4451383}" dt="2022-03-22T05:20:13.542" v="5" actId="6549"/>
@@ -1054,7 +1109,7 @@
             <a:fld id="{85522811-C5C6-42D2-A409-F8556720C93F}" type="datetimeFigureOut">
               <a:rPr lang="uk-UA" smtClean="0"/>
               <a:pPr/>
-              <a:t>22.03.2022</a:t>
+              <a:t>15.10.2022</a:t>
             </a:fld>
             <a:endParaRPr lang="uk-UA"/>
           </a:p>
@@ -1594,7 +1649,7 @@
             <a:fld id="{E6FC6B0D-6115-4D7C-8040-9C8E2349BB6E}" type="datetime1">
               <a:rPr lang="uk-UA" smtClean="0"/>
               <a:pPr/>
-              <a:t>22.03.2022</a:t>
+              <a:t>15.10.2022</a:t>
             </a:fld>
             <a:endParaRPr lang="uk-UA"/>
           </a:p>
@@ -1761,7 +1816,7 @@
             <a:fld id="{996367BA-0A39-4DE2-BFC3-D5290044365E}" type="datetime1">
               <a:rPr lang="uk-UA" smtClean="0"/>
               <a:pPr/>
-              <a:t>22.03.2022</a:t>
+              <a:t>15.10.2022</a:t>
             </a:fld>
             <a:endParaRPr lang="uk-UA"/>
           </a:p>
@@ -1938,7 +1993,7 @@
             <a:fld id="{1BD6A67F-6C29-47DC-AF8A-FDB3C787DF70}" type="datetime1">
               <a:rPr lang="uk-UA" smtClean="0"/>
               <a:pPr/>
-              <a:t>22.03.2022</a:t>
+              <a:t>15.10.2022</a:t>
             </a:fld>
             <a:endParaRPr lang="uk-UA"/>
           </a:p>
@@ -2105,7 +2160,7 @@
             <a:fld id="{1657D9C5-7FF1-434F-B56E-9BAD559744E9}" type="datetime1">
               <a:rPr lang="uk-UA" smtClean="0"/>
               <a:pPr/>
-              <a:t>22.03.2022</a:t>
+              <a:t>15.10.2022</a:t>
             </a:fld>
             <a:endParaRPr lang="uk-UA"/>
           </a:p>
@@ -2348,7 +2403,7 @@
             <a:fld id="{2CEB0FC9-DE63-476B-A1A9-BE934D9049F8}" type="datetime1">
               <a:rPr lang="uk-UA" smtClean="0"/>
               <a:pPr/>
-              <a:t>22.03.2022</a:t>
+              <a:t>15.10.2022</a:t>
             </a:fld>
             <a:endParaRPr lang="uk-UA"/>
           </a:p>
@@ -2633,7 +2688,7 @@
             <a:fld id="{F964460F-86E2-4DF6-9D0F-12F5005CF375}" type="datetime1">
               <a:rPr lang="uk-UA" smtClean="0"/>
               <a:pPr/>
-              <a:t>22.03.2022</a:t>
+              <a:t>15.10.2022</a:t>
             </a:fld>
             <a:endParaRPr lang="uk-UA"/>
           </a:p>
@@ -3052,7 +3107,7 @@
             <a:fld id="{C521715E-DDCD-4267-B0A5-2918B6F6768A}" type="datetime1">
               <a:rPr lang="uk-UA" smtClean="0"/>
               <a:pPr/>
-              <a:t>22.03.2022</a:t>
+              <a:t>15.10.2022</a:t>
             </a:fld>
             <a:endParaRPr lang="uk-UA"/>
           </a:p>
@@ -3167,7 +3222,7 @@
             <a:fld id="{9289842C-EB2D-4EBB-A272-2F6A49D9794D}" type="datetime1">
               <a:rPr lang="uk-UA" smtClean="0"/>
               <a:pPr/>
-              <a:t>22.03.2022</a:t>
+              <a:t>15.10.2022</a:t>
             </a:fld>
             <a:endParaRPr lang="uk-UA"/>
           </a:p>
@@ -3259,7 +3314,7 @@
             <a:fld id="{D036F091-B700-4B52-99AC-85D0FD94D904}" type="datetime1">
               <a:rPr lang="uk-UA" smtClean="0"/>
               <a:pPr/>
-              <a:t>22.03.2022</a:t>
+              <a:t>15.10.2022</a:t>
             </a:fld>
             <a:endParaRPr lang="uk-UA"/>
           </a:p>
@@ -3533,7 +3588,7 @@
             <a:fld id="{B35DFABA-3811-4634-B803-2EAC4CD0063B}" type="datetime1">
               <a:rPr lang="uk-UA" smtClean="0"/>
               <a:pPr/>
-              <a:t>22.03.2022</a:t>
+              <a:t>15.10.2022</a:t>
             </a:fld>
             <a:endParaRPr lang="uk-UA"/>
           </a:p>
@@ -3783,7 +3838,7 @@
             <a:fld id="{8A9EA25E-F88E-463A-A119-D1E55A881002}" type="datetime1">
               <a:rPr lang="uk-UA" smtClean="0"/>
               <a:pPr/>
-              <a:t>22.03.2022</a:t>
+              <a:t>15.10.2022</a:t>
             </a:fld>
             <a:endParaRPr lang="uk-UA"/>
           </a:p>
@@ -3993,7 +4048,7 @@
             <a:fld id="{E708ED03-0080-49A2-B709-7DA4ACB3A1C3}" type="datetime1">
               <a:rPr lang="uk-UA" smtClean="0"/>
               <a:pPr/>
-              <a:t>22.03.2022</a:t>
+              <a:t>15.10.2022</a:t>
             </a:fld>
             <a:endParaRPr lang="uk-UA"/>
           </a:p>
@@ -5642,7 +5697,7 @@
       </p:grpSpPr>
       <p:sp>
         <p:nvSpPr>
-          <p:cNvPr id="20" name="Номер слайда 36"/>
+          <p:cNvPr id="7" name="Номер слайда 36"/>
           <p:cNvSpPr txBox="1">
             <a:spLocks/>
           </p:cNvSpPr>
@@ -5650,7 +5705,7 @@
         </p:nvSpPr>
         <p:spPr>
           <a:xfrm>
-            <a:off x="11208568" y="6165304"/>
+            <a:off x="11136560" y="6165304"/>
             <a:ext cx="648072" cy="432048"/>
           </a:xfrm>
           <a:prstGeom prst="roundRect">
@@ -5712,13 +5767,62 @@
       </p:sp>
       <p:sp>
         <p:nvSpPr>
-          <p:cNvPr id="3" name="TextBox 2"/>
+          <p:cNvPr id="10" name="TextBox 9"/>
           <p:cNvSpPr txBox="1"/>
           <p:nvPr/>
         </p:nvSpPr>
         <p:spPr>
           <a:xfrm>
-            <a:off x="0" y="260648"/>
+            <a:off x="6952130" y="2780928"/>
+            <a:ext cx="4328446" cy="2246769"/>
+          </a:xfrm>
+          <a:prstGeom prst="rect">
+            <a:avLst/>
+          </a:prstGeom>
+          <a:noFill/>
+        </p:spPr>
+        <p:txBody>
+          <a:bodyPr wrap="square" rtlCol="0">
+            <a:spAutoFit/>
+          </a:bodyPr>
+          <a:lstStyle/>
+          <a:p>
+            <a:r>
+              <a:rPr lang="ru-RU" sz="2800" b="1" dirty="0"/>
+              <a:t>Задача: Пересчитать</a:t>
+            </a:r>
+            <a:r>
+              <a:rPr lang="ru-RU" sz="2800" dirty="0"/>
+              <a:t> цены на товары </a:t>
+            </a:r>
+            <a:r>
+              <a:rPr lang="ru-RU" sz="2800" b="1" dirty="0"/>
+              <a:t>в гривну </a:t>
+            </a:r>
+            <a:r>
+              <a:rPr lang="ru-RU" sz="2800" dirty="0"/>
+              <a:t>в соответствии с </a:t>
+            </a:r>
+            <a:r>
+              <a:rPr lang="ru-RU" sz="2800" b="1" dirty="0"/>
+              <a:t>актуальными</a:t>
+            </a:r>
+            <a:r>
+              <a:rPr lang="ru-RU" sz="2800" dirty="0"/>
+              <a:t> курсами валют НБУ.</a:t>
+            </a:r>
+          </a:p>
+        </p:txBody>
+      </p:sp>
+      <p:sp>
+        <p:nvSpPr>
+          <p:cNvPr id="12" name="TextBox 11"/>
+          <p:cNvSpPr txBox="1"/>
+          <p:nvPr/>
+        </p:nvSpPr>
+        <p:spPr>
+          <a:xfrm>
+            <a:off x="0" y="334397"/>
             <a:ext cx="12192000" cy="646331"/>
           </a:xfrm>
           <a:prstGeom prst="rect">
@@ -5739,25 +5843,115 @@
             </a:r>
             <a:r>
               <a:rPr lang="en-US" sz="3600" b="1" dirty="0"/>
-              <a:t>#G.</a:t>
-            </a:r>
-            <a:r>
-              <a:rPr lang="uk-UA" sz="3600" b="1" dirty="0"/>
-              <a:t>1</a:t>
-            </a:r>
-          </a:p>
-        </p:txBody>
-      </p:sp>
-      <p:sp>
-        <p:nvSpPr>
-          <p:cNvPr id="2" name="TextBox 1"/>
+              <a:t>#G.1</a:t>
+            </a:r>
+            <a:endParaRPr lang="uk-UA" sz="3600" b="1" dirty="0"/>
+          </a:p>
+        </p:txBody>
+      </p:sp>
+      <p:pic>
+        <p:nvPicPr>
+          <p:cNvPr id="3" name="Рисунок 2"/>
+          <p:cNvPicPr>
+            <a:picLocks noChangeAspect="1"/>
+          </p:cNvPicPr>
+          <p:nvPr/>
+        </p:nvPicPr>
+        <p:blipFill>
+          <a:blip r:embed="rId2"/>
+          <a:stretch>
+            <a:fillRect/>
+          </a:stretch>
+        </p:blipFill>
+        <p:spPr>
+          <a:xfrm>
+            <a:off x="839416" y="1544092"/>
+            <a:ext cx="5653803" cy="4549204"/>
+          </a:xfrm>
+          <a:prstGeom prst="rect">
+            <a:avLst/>
+          </a:prstGeom>
+        </p:spPr>
+      </p:pic>
+      <p:sp>
+        <p:nvSpPr>
+          <p:cNvPr id="11" name="Прямоугольник 10"/>
+          <p:cNvSpPr/>
+          <p:nvPr/>
+        </p:nvSpPr>
+        <p:spPr>
+          <a:xfrm>
+            <a:off x="6952130" y="1484784"/>
+            <a:ext cx="4328446" cy="1200329"/>
+          </a:xfrm>
+          <a:prstGeom prst="rect">
+            <a:avLst/>
+          </a:prstGeom>
+        </p:spPr>
+        <p:txBody>
+          <a:bodyPr wrap="square">
+            <a:spAutoFit/>
+          </a:bodyPr>
+          <a:lstStyle/>
+          <a:p>
+            <a:r>
+              <a:rPr lang="ru-RU" sz="2400" dirty="0"/>
+              <a:t>Воспользуйтесь шаблоном в </a:t>
+            </a:r>
+            <a:r>
+              <a:rPr lang="ru-RU" sz="2400" dirty="0" err="1"/>
+              <a:t>репозитории</a:t>
+            </a:r>
+            <a:r>
+              <a:rPr lang="ru-RU" sz="2400" dirty="0"/>
+              <a:t> занятия: </a:t>
+            </a:r>
+            <a:br>
+              <a:rPr lang="ru-RU" sz="2400" dirty="0"/>
+            </a:br>
+            <a:r>
+              <a:rPr lang="en-US" sz="2400" b="1" dirty="0">
+                <a:solidFill>
+                  <a:srgbClr val="0070C0"/>
+                </a:solidFill>
+              </a:rPr>
+              <a:t>./</a:t>
+            </a:r>
+            <a:r>
+              <a:rPr lang="en-US" sz="2400" b="1" dirty="0" err="1">
+                <a:solidFill>
+                  <a:srgbClr val="0070C0"/>
+                </a:solidFill>
+              </a:rPr>
+              <a:t>src</a:t>
+            </a:r>
+            <a:r>
+              <a:rPr lang="en-US" sz="2400" b="1" dirty="0">
+                <a:solidFill>
+                  <a:srgbClr val="0070C0"/>
+                </a:solidFill>
+              </a:rPr>
+              <a:t>/homework-template</a:t>
+            </a:r>
+          </a:p>
+        </p:txBody>
+      </p:sp>
+      <p:sp>
+        <p:nvSpPr>
+          <p:cNvPr id="4" name="TextBox 3">
+            <a:extLst>
+              <a:ext uri="{FF2B5EF4-FFF2-40B4-BE49-F238E27FC236}">
+                <a16:creationId xmlns:a16="http://schemas.microsoft.com/office/drawing/2014/main" id="{40EA5EA8-C923-5115-B669-9BB2BD8261CF}"/>
+              </a:ext>
+            </a:extLst>
+          </p:cNvPr>
           <p:cNvSpPr txBox="1"/>
           <p:nvPr/>
         </p:nvSpPr>
         <p:spPr>
           <a:xfrm>
-            <a:off x="3359696" y="1102678"/>
-            <a:ext cx="8129314" cy="1200329"/>
+            <a:off x="6952130" y="5169966"/>
+            <a:ext cx="3968406" cy="923330"/>
           </a:xfrm>
           <a:prstGeom prst="rect">
             <a:avLst/>
@@ -5765,356 +5959,28 @@
           <a:noFill/>
         </p:spPr>
         <p:txBody>
-          <a:bodyPr wrap="square" rtlCol="0">
-            <a:spAutoFit/>
-          </a:bodyPr>
-          <a:lstStyle/>
-          <a:p>
-            <a:r>
-              <a:rPr lang="ru-RU" sz="2400" dirty="0"/>
-              <a:t>Ваша задача, вести список 5-ти ближайших, к пользователю</a:t>
-            </a:r>
-            <a:r>
-              <a:rPr lang="en-US" sz="2400" dirty="0"/>
-              <a:t> </a:t>
-            </a:r>
-            <a:r>
-              <a:rPr lang="ru-RU" sz="2400" b="1" dirty="0"/>
-              <a:t>ТСО</a:t>
-            </a:r>
-            <a:r>
-              <a:rPr lang="ru-RU" sz="2400" dirty="0"/>
-              <a:t> (</a:t>
-            </a:r>
-            <a:r>
-              <a:rPr lang="ru-RU" sz="2400" b="1" dirty="0">
-                <a:solidFill>
-                  <a:srgbClr val="00B050"/>
-                </a:solidFill>
-              </a:rPr>
-              <a:t>с адресом</a:t>
-            </a:r>
-            <a:r>
-              <a:rPr lang="ru-RU" sz="2400" dirty="0"/>
-              <a:t>, </a:t>
-            </a:r>
-            <a:r>
-              <a:rPr lang="ru-RU" sz="2400" b="1" dirty="0"/>
-              <a:t>и </a:t>
-            </a:r>
-            <a:r>
-              <a:rPr lang="ru-RU" sz="2400" b="1" dirty="0">
-                <a:solidFill>
-                  <a:schemeClr val="accent6">
-                    <a:lumMod val="75000"/>
-                  </a:schemeClr>
-                </a:solidFill>
-              </a:rPr>
-              <a:t>расстоянием в метрах до пользователя</a:t>
-            </a:r>
-            <a:r>
-              <a:rPr lang="ru-RU" sz="2400" dirty="0"/>
-              <a:t>), отсортированных по расстоянию до пользователя.</a:t>
-            </a:r>
-          </a:p>
-        </p:txBody>
-      </p:sp>
-      <p:pic>
-        <p:nvPicPr>
-          <p:cNvPr id="1028" name="Picture 4" descr="How does geolocation work?"/>
-          <p:cNvPicPr>
-            <a:picLocks noChangeAspect="1" noChangeArrowheads="1"/>
-          </p:cNvPicPr>
-          <p:nvPr/>
-        </p:nvPicPr>
-        <p:blipFill>
-          <a:blip r:embed="rId2">
-            <a:extLst>
-              <a:ext uri="{28A0092B-C50C-407E-A947-70E740481C1C}">
-                <a14:useLocalDpi xmlns:a14="http://schemas.microsoft.com/office/drawing/2010/main" val="0"/>
-              </a:ext>
-            </a:extLst>
-          </a:blip>
-          <a:srcRect/>
-          <a:stretch>
-            <a:fillRect/>
-          </a:stretch>
-        </p:blipFill>
-        <p:spPr bwMode="auto">
-          <a:xfrm>
-            <a:off x="4727848" y="5150525"/>
-            <a:ext cx="4112394" cy="1627023"/>
-          </a:xfrm>
-          <a:prstGeom prst="rect">
-            <a:avLst/>
-          </a:prstGeom>
-          <a:noFill/>
-          <a:extLst>
-            <a:ext uri="{909E8E84-426E-40DD-AFC4-6F175D3DCCD1}">
-              <a14:hiddenFill xmlns:a14="http://schemas.microsoft.com/office/drawing/2010/main">
-                <a:solidFill>
-                  <a:srgbClr val="FFFFFF"/>
-                </a:solidFill>
-              </a14:hiddenFill>
-            </a:ext>
-          </a:extLst>
-        </p:spPr>
-      </p:pic>
-      <p:sp>
-        <p:nvSpPr>
-          <p:cNvPr id="14" name="TextBox 13">
-            <a:extLst>
-              <a:ext uri="{FF2B5EF4-FFF2-40B4-BE49-F238E27FC236}">
-                <a16:creationId xmlns:a16="http://schemas.microsoft.com/office/drawing/2014/main" id="{322D53B2-9D72-4748-BDA7-A2CB31F95D3D}"/>
-              </a:ext>
-            </a:extLst>
-          </p:cNvPr>
-          <p:cNvSpPr txBox="1"/>
-          <p:nvPr/>
-        </p:nvSpPr>
-        <p:spPr>
-          <a:xfrm>
-            <a:off x="3359696" y="2560836"/>
-            <a:ext cx="8424936" cy="1754326"/>
-          </a:xfrm>
-          <a:prstGeom prst="rect">
-            <a:avLst/>
-          </a:prstGeom>
-          <a:noFill/>
-        </p:spPr>
-        <p:txBody>
           <a:bodyPr wrap="square">
             <a:spAutoFit/>
           </a:bodyPr>
           <a:lstStyle/>
           <a:p>
             <a:r>
-              <a:rPr lang="ru-RU" b="1" dirty="0"/>
-              <a:t>Документация</a:t>
-            </a:r>
-            <a:r>
-              <a:rPr lang="uk-UA" dirty="0"/>
-              <a:t>: </a:t>
-            </a:r>
-            <a:r>
-              <a:rPr lang="en-US" b="1" dirty="0">
+              <a:rPr lang="uk-UA" dirty="0">
                 <a:hlinkClick r:id="rId3"/>
               </a:rPr>
-              <a:t>https://api.privatbank.ua/#p24</a:t>
-            </a:r>
-            <a:r>
-              <a:rPr lang="en-US" b="1">
-                <a:hlinkClick r:id="rId3"/>
-              </a:rPr>
-              <a:t>/terminals</a:t>
-            </a:r>
-            <a:endParaRPr lang="en-US" b="1"/>
-          </a:p>
-          <a:p>
+              <a:t>https://bank.gov.ua/NBUStatService/v1/statdirectory/exchange?json</a:t>
+            </a:r>
             <a:endParaRPr lang="en-US" dirty="0"/>
           </a:p>
           <a:p>
-            <a:r>
-              <a:rPr lang="uk-UA" b="1" dirty="0"/>
-              <a:t>API URL</a:t>
-            </a:r>
-            <a:r>
-              <a:rPr lang="uk-UA" dirty="0"/>
-              <a:t>: </a:t>
-            </a:r>
-            <a:r>
-              <a:rPr lang="en-US" b="1" dirty="0">
-                <a:hlinkClick r:id="rId4"/>
-              </a:rPr>
-              <a:t>https://api.privatbank.ua/p24api/infrastructure?json&amp;tso&amp;address=&amp;city=</a:t>
-            </a:r>
-            <a:endParaRPr lang="en-US" b="1" dirty="0"/>
-          </a:p>
-          <a:p>
             <a:endParaRPr lang="uk-UA" dirty="0"/>
-          </a:p>
-          <a:p>
-            <a:r>
-              <a:rPr lang="ru-RU" b="1" dirty="0"/>
-              <a:t>Можно взять сохранённый</a:t>
-            </a:r>
-            <a:r>
-              <a:rPr lang="uk-UA" b="1" dirty="0"/>
-              <a:t> </a:t>
-            </a:r>
-            <a:r>
-              <a:rPr lang="en-US" b="1" dirty="0"/>
-              <a:t>JSON </a:t>
-            </a:r>
-            <a:r>
-              <a:rPr lang="ru-RU" b="1" dirty="0"/>
-              <a:t>в репозитории:</a:t>
-            </a:r>
-            <a:r>
-              <a:rPr lang="ru-RU" dirty="0"/>
-              <a:t> </a:t>
-            </a:r>
-            <a:r>
-              <a:rPr lang="en-US" b="1" dirty="0">
-                <a:solidFill>
-                  <a:srgbClr val="00B050"/>
-                </a:solidFill>
-              </a:rPr>
-              <a:t>./</a:t>
-            </a:r>
-            <a:r>
-              <a:rPr lang="en-US" b="1" dirty="0" err="1">
-                <a:solidFill>
-                  <a:srgbClr val="00B050"/>
-                </a:solidFill>
-              </a:rPr>
-              <a:t>src</a:t>
-            </a:r>
-            <a:r>
-              <a:rPr lang="en-US" b="1" dirty="0">
-                <a:solidFill>
-                  <a:srgbClr val="00B050"/>
-                </a:solidFill>
-              </a:rPr>
-              <a:t>/homework-template</a:t>
-            </a:r>
-            <a:endParaRPr lang="ru-RU" b="1" dirty="0">
-              <a:solidFill>
-                <a:srgbClr val="00B050"/>
-              </a:solidFill>
-            </a:endParaRPr>
-          </a:p>
-          <a:p>
-            <a:endParaRPr lang="ru-RU" b="1" dirty="0">
-              <a:solidFill>
-                <a:schemeClr val="accent6">
-                  <a:lumMod val="75000"/>
-                </a:schemeClr>
-              </a:solidFill>
-            </a:endParaRPr>
-          </a:p>
-        </p:txBody>
-      </p:sp>
-      <p:pic>
-        <p:nvPicPr>
-          <p:cNvPr id="4" name="Picture 2" descr="Терминалы самообслуживания ПриватБанка">
-            <a:extLst>
-              <a:ext uri="{FF2B5EF4-FFF2-40B4-BE49-F238E27FC236}">
-                <a16:creationId xmlns:a16="http://schemas.microsoft.com/office/drawing/2014/main" id="{D64CE7CD-81C1-42D6-A327-E1DED7EF134E}"/>
-              </a:ext>
-            </a:extLst>
-          </p:cNvPr>
-          <p:cNvPicPr>
-            <a:picLocks noChangeAspect="1" noChangeArrowheads="1"/>
-          </p:cNvPicPr>
-          <p:nvPr/>
-        </p:nvPicPr>
-        <p:blipFill>
-          <a:blip r:embed="rId5">
-            <a:extLst>
-              <a:ext uri="{28A0092B-C50C-407E-A947-70E740481C1C}">
-                <a14:useLocalDpi xmlns:a14="http://schemas.microsoft.com/office/drawing/2010/main" val="0"/>
-              </a:ext>
-            </a:extLst>
-          </a:blip>
-          <a:srcRect/>
-          <a:stretch>
-            <a:fillRect/>
-          </a:stretch>
-        </p:blipFill>
-        <p:spPr bwMode="auto">
-          <a:xfrm>
-            <a:off x="479376" y="1698625"/>
-            <a:ext cx="2714625" cy="3990975"/>
-          </a:xfrm>
-          <a:prstGeom prst="rect">
-            <a:avLst/>
-          </a:prstGeom>
-          <a:noFill/>
-          <a:extLst>
-            <a:ext uri="{909E8E84-426E-40DD-AFC4-6F175D3DCCD1}">
-              <a14:hiddenFill xmlns:a14="http://schemas.microsoft.com/office/drawing/2010/main">
-                <a:solidFill>
-                  <a:srgbClr val="FFFFFF"/>
-                </a:solidFill>
-              </a14:hiddenFill>
-            </a:ext>
-          </a:extLst>
-        </p:spPr>
-      </p:pic>
-      <p:sp>
-        <p:nvSpPr>
-          <p:cNvPr id="9" name="TextBox 8">
-            <a:extLst>
-              <a:ext uri="{FF2B5EF4-FFF2-40B4-BE49-F238E27FC236}">
-                <a16:creationId xmlns:a16="http://schemas.microsoft.com/office/drawing/2014/main" id="{FFEEB9E9-8524-4F4E-96DC-75F078B786F9}"/>
-              </a:ext>
-            </a:extLst>
-          </p:cNvPr>
-          <p:cNvSpPr txBox="1"/>
-          <p:nvPr/>
-        </p:nvSpPr>
-        <p:spPr>
-          <a:xfrm>
-            <a:off x="3359696" y="4149080"/>
-            <a:ext cx="7704856" cy="646331"/>
-          </a:xfrm>
-          <a:prstGeom prst="rect">
-            <a:avLst/>
-          </a:prstGeom>
-        </p:spPr>
-        <p:style>
-          <a:lnRef idx="2">
-            <a:schemeClr val="accent6"/>
-          </a:lnRef>
-          <a:fillRef idx="1">
-            <a:schemeClr val="lt1"/>
-          </a:fillRef>
-          <a:effectRef idx="0">
-            <a:schemeClr val="accent6"/>
-          </a:effectRef>
-          <a:fontRef idx="minor">
-            <a:schemeClr val="dk1"/>
-          </a:fontRef>
-        </p:style>
-        <p:txBody>
-          <a:bodyPr wrap="square">
-            <a:spAutoFit/>
-          </a:bodyPr>
-          <a:lstStyle/>
-          <a:p>
-            <a:r>
-              <a:rPr lang="ru-RU" b="1" dirty="0">
-                <a:solidFill>
-                  <a:srgbClr val="00B050"/>
-                </a:solidFill>
-              </a:rPr>
-              <a:t>Доп. высокая сложность: </a:t>
-            </a:r>
-            <a:r>
-              <a:rPr lang="ru-RU" b="1" dirty="0">
-                <a:solidFill>
-                  <a:schemeClr val="accent6">
-                    <a:lumMod val="75000"/>
-                  </a:schemeClr>
-                </a:solidFill>
-              </a:rPr>
-              <a:t>интегрировать какой-либо картографический сервис и отобразить на странице карту с ближайшим терминалом. </a:t>
-            </a:r>
-            <a:endParaRPr lang="uk-UA" b="1" dirty="0">
-              <a:solidFill>
-                <a:schemeClr val="accent6">
-                  <a:lumMod val="75000"/>
-                </a:schemeClr>
-              </a:solidFill>
-            </a:endParaRPr>
           </a:p>
         </p:txBody>
       </p:sp>
     </p:spTree>
     <p:extLst>
       <p:ext uri="{BB962C8B-B14F-4D97-AF65-F5344CB8AC3E}">
-        <p14:creationId xmlns:p14="http://schemas.microsoft.com/office/powerpoint/2010/main" val="3356359888"/>
+        <p14:creationId xmlns:p14="http://schemas.microsoft.com/office/powerpoint/2010/main" val="3253984686"/>
       </p:ext>
     </p:extLst>
   </p:cSld>

</xml_diff>